<commit_message>
Updates and additional files for different analyzes
Improvement in codes.  Additional analyzes include:  1. doubling the contact area ROI (mri_fitr3x2.m), 2. combining deep and superficial cartilage layers (mri_fitr4.m), and 3. calculating T1rho and T2* for the entire segmented tibiofemoral cartilage (not just the ROI) (mri_fitr5.m).
</commit_message>
<xml_diff>
--- a/ImageAnalysisPipeline6.pptx
+++ b/ImageAnalysisPipeline6.pptx
@@ -224,7 +224,7 @@
           <a:p>
             <a:fld id="{FC708371-2EE1-4AD5-8AAD-1B917E870976}" type="datetimeFigureOut">
               <a:rPr lang="en-US" smtClean="0"/>
-              <a:t>6/17/2022</a:t>
+              <a:t>8/16/2022</a:t>
             </a:fld>
             <a:endParaRPr lang="en-US"/>
           </a:p>
@@ -790,7 +790,7 @@
           <a:p>
             <a:fld id="{6B46607B-1A35-499A-9B28-C398566005CC}" type="datetimeFigureOut">
               <a:rPr lang="en-US" smtClean="0"/>
-              <a:t>6/17/2022</a:t>
+              <a:t>8/16/2022</a:t>
             </a:fld>
             <a:endParaRPr lang="en-US"/>
           </a:p>
@@ -960,7 +960,7 @@
           <a:p>
             <a:fld id="{6B46607B-1A35-499A-9B28-C398566005CC}" type="datetimeFigureOut">
               <a:rPr lang="en-US" smtClean="0"/>
-              <a:t>6/17/2022</a:t>
+              <a:t>8/16/2022</a:t>
             </a:fld>
             <a:endParaRPr lang="en-US"/>
           </a:p>
@@ -1140,7 +1140,7 @@
           <a:p>
             <a:fld id="{6B46607B-1A35-499A-9B28-C398566005CC}" type="datetimeFigureOut">
               <a:rPr lang="en-US" smtClean="0"/>
-              <a:t>6/17/2022</a:t>
+              <a:t>8/16/2022</a:t>
             </a:fld>
             <a:endParaRPr lang="en-US"/>
           </a:p>
@@ -1310,7 +1310,7 @@
           <a:p>
             <a:fld id="{6B46607B-1A35-499A-9B28-C398566005CC}" type="datetimeFigureOut">
               <a:rPr lang="en-US" smtClean="0"/>
-              <a:t>6/17/2022</a:t>
+              <a:t>8/16/2022</a:t>
             </a:fld>
             <a:endParaRPr lang="en-US"/>
           </a:p>
@@ -1554,7 +1554,7 @@
           <a:p>
             <a:fld id="{6B46607B-1A35-499A-9B28-C398566005CC}" type="datetimeFigureOut">
               <a:rPr lang="en-US" smtClean="0"/>
-              <a:t>6/17/2022</a:t>
+              <a:t>8/16/2022</a:t>
             </a:fld>
             <a:endParaRPr lang="en-US"/>
           </a:p>
@@ -1786,7 +1786,7 @@
           <a:p>
             <a:fld id="{6B46607B-1A35-499A-9B28-C398566005CC}" type="datetimeFigureOut">
               <a:rPr lang="en-US" smtClean="0"/>
-              <a:t>6/17/2022</a:t>
+              <a:t>8/16/2022</a:t>
             </a:fld>
             <a:endParaRPr lang="en-US"/>
           </a:p>
@@ -2153,7 +2153,7 @@
           <a:p>
             <a:fld id="{6B46607B-1A35-499A-9B28-C398566005CC}" type="datetimeFigureOut">
               <a:rPr lang="en-US" smtClean="0"/>
-              <a:t>6/17/2022</a:t>
+              <a:t>8/16/2022</a:t>
             </a:fld>
             <a:endParaRPr lang="en-US"/>
           </a:p>
@@ -2271,7 +2271,7 @@
           <a:p>
             <a:fld id="{6B46607B-1A35-499A-9B28-C398566005CC}" type="datetimeFigureOut">
               <a:rPr lang="en-US" smtClean="0"/>
-              <a:t>6/17/2022</a:t>
+              <a:t>8/16/2022</a:t>
             </a:fld>
             <a:endParaRPr lang="en-US"/>
           </a:p>
@@ -2366,7 +2366,7 @@
           <a:p>
             <a:fld id="{6B46607B-1A35-499A-9B28-C398566005CC}" type="datetimeFigureOut">
               <a:rPr lang="en-US" smtClean="0"/>
-              <a:t>6/17/2022</a:t>
+              <a:t>8/16/2022</a:t>
             </a:fld>
             <a:endParaRPr lang="en-US"/>
           </a:p>
@@ -2643,7 +2643,7 @@
           <a:p>
             <a:fld id="{6B46607B-1A35-499A-9B28-C398566005CC}" type="datetimeFigureOut">
               <a:rPr lang="en-US" smtClean="0"/>
-              <a:t>6/17/2022</a:t>
+              <a:t>8/16/2022</a:t>
             </a:fld>
             <a:endParaRPr lang="en-US"/>
           </a:p>
@@ -2900,7 +2900,7 @@
           <a:p>
             <a:fld id="{6B46607B-1A35-499A-9B28-C398566005CC}" type="datetimeFigureOut">
               <a:rPr lang="en-US" smtClean="0"/>
-              <a:t>6/17/2022</a:t>
+              <a:t>8/16/2022</a:t>
             </a:fld>
             <a:endParaRPr lang="en-US"/>
           </a:p>
@@ -3113,7 +3113,7 @@
           <a:p>
             <a:fld id="{6B46607B-1A35-499A-9B28-C398566005CC}" type="datetimeFigureOut">
               <a:rPr lang="en-US" smtClean="0"/>
-              <a:t>6/17/2022</a:t>
+              <a:t>8/16/2022</a:t>
             </a:fld>
             <a:endParaRPr lang="en-US"/>
           </a:p>
@@ -5896,7 +5896,7 @@
             </a:r>
             <a:r>
               <a:rPr lang="en-US" sz="1200" i="1" dirty="0"/>
-              <a:t>mri_fitr2.m</a:t>
+              <a:t>mri_fitr3.m</a:t>
             </a:r>
           </a:p>
           <a:p>
@@ -5961,8 +5961,8 @@
         </p:nvSpPr>
         <p:spPr>
           <a:xfrm>
-            <a:off x="4988911" y="2869414"/>
-            <a:ext cx="1281120" cy="646331"/>
+            <a:off x="4980479" y="2869414"/>
+            <a:ext cx="1297984" cy="646331"/>
           </a:xfrm>
           <a:prstGeom prst="rect">
             <a:avLst/>
@@ -5989,12 +5989,8 @@
           </a:p>
           <a:p>
             <a:r>
-              <a:rPr lang="en-US" sz="1200" dirty="0" err="1"/>
-              <a:t>mri_fitr</a:t>
-            </a:r>
-            <a:r>
               <a:rPr lang="en-US" sz="1200" dirty="0"/>
-              <a:t>*.</a:t>
+              <a:t>mri_fitr3*.</a:t>
             </a:r>
             <a:r>
               <a:rPr lang="en-US" sz="1200" dirty="0" err="1"/>
@@ -6124,7 +6120,7 @@
         <p:spPr>
           <a:xfrm>
             <a:off x="4247976" y="3192580"/>
-            <a:ext cx="740935" cy="0"/>
+            <a:ext cx="732503" cy="0"/>
           </a:xfrm>
           <a:prstGeom prst="straightConnector1">
             <a:avLst/>
@@ -6240,7 +6236,7 @@
           <a:p>
             <a:r>
               <a:rPr lang="en-US" sz="1200" dirty="0"/>
-              <a:t>mri_fitr2.xlsx</a:t>
+              <a:t>mri_fitr3.xlsx</a:t>
             </a:r>
           </a:p>
           <a:p>
@@ -6383,7 +6379,7 @@
           <a:p>
             <a:r>
               <a:rPr lang="en-US" sz="1200" dirty="0"/>
-              <a:t>mri_fitr2.mat</a:t>
+              <a:t>mri_fitr3.mat</a:t>
             </a:r>
           </a:p>
         </p:txBody>

</xml_diff>